<commit_message>
revised intro slide set
</commit_message>
<xml_diff>
--- a/_static/argonne-cloud-computing.pptx
+++ b/_static/argonne-cloud-computing.pptx
@@ -6,18 +6,20 @@
   </p:sldMasterIdLst>
   <p:sldIdLst>
     <p:sldId id="257" r:id="rId2"/>
-    <p:sldId id="258" r:id="rId3"/>
-    <p:sldId id="259" r:id="rId4"/>
-    <p:sldId id="260" r:id="rId5"/>
-    <p:sldId id="262" r:id="rId6"/>
-    <p:sldId id="263" r:id="rId7"/>
-    <p:sldId id="264" r:id="rId8"/>
-    <p:sldId id="265" r:id="rId9"/>
-    <p:sldId id="266" r:id="rId10"/>
-    <p:sldId id="267" r:id="rId11"/>
-    <p:sldId id="268" r:id="rId12"/>
-    <p:sldId id="269" r:id="rId13"/>
-    <p:sldId id="270" r:id="rId14"/>
+    <p:sldId id="272" r:id="rId3"/>
+    <p:sldId id="271" r:id="rId4"/>
+    <p:sldId id="258" r:id="rId5"/>
+    <p:sldId id="259" r:id="rId6"/>
+    <p:sldId id="260" r:id="rId7"/>
+    <p:sldId id="262" r:id="rId8"/>
+    <p:sldId id="263" r:id="rId9"/>
+    <p:sldId id="264" r:id="rId10"/>
+    <p:sldId id="265" r:id="rId11"/>
+    <p:sldId id="266" r:id="rId12"/>
+    <p:sldId id="267" r:id="rId13"/>
+    <p:sldId id="268" r:id="rId14"/>
+    <p:sldId id="269" r:id="rId15"/>
+    <p:sldId id="270" r:id="rId16"/>
   </p:sldIdLst>
   <p:sldSz cx="9144000" cy="6858000" type="screen4x3"/>
   <p:notesSz cx="6858000" cy="9144000"/>
@@ -300,7 +302,7 @@
           <a:p>
             <a:fld id="{6B8D1CAE-1003-EF41-A6BD-5C2D6A48FE05}" type="datetimeFigureOut">
               <a:rPr lang="en-US" smtClean="0"/>
-              <a:t>10/3/14</a:t>
+              <a:t>10/4/14</a:t>
             </a:fld>
             <a:endParaRPr lang="en-US"/>
           </a:p>
@@ -470,7 +472,7 @@
           <a:p>
             <a:fld id="{6B8D1CAE-1003-EF41-A6BD-5C2D6A48FE05}" type="datetimeFigureOut">
               <a:rPr lang="en-US" smtClean="0"/>
-              <a:t>10/3/14</a:t>
+              <a:t>10/4/14</a:t>
             </a:fld>
             <a:endParaRPr lang="en-US"/>
           </a:p>
@@ -650,7 +652,7 @@
           <a:p>
             <a:fld id="{6B8D1CAE-1003-EF41-A6BD-5C2D6A48FE05}" type="datetimeFigureOut">
               <a:rPr lang="en-US" smtClean="0"/>
-              <a:t>10/3/14</a:t>
+              <a:t>10/4/14</a:t>
             </a:fld>
             <a:endParaRPr lang="en-US"/>
           </a:p>
@@ -820,7 +822,7 @@
           <a:p>
             <a:fld id="{6B8D1CAE-1003-EF41-A6BD-5C2D6A48FE05}" type="datetimeFigureOut">
               <a:rPr lang="en-US" smtClean="0"/>
-              <a:t>10/3/14</a:t>
+              <a:t>10/4/14</a:t>
             </a:fld>
             <a:endParaRPr lang="en-US"/>
           </a:p>
@@ -1066,7 +1068,7 @@
           <a:p>
             <a:fld id="{6B8D1CAE-1003-EF41-A6BD-5C2D6A48FE05}" type="datetimeFigureOut">
               <a:rPr lang="en-US" smtClean="0"/>
-              <a:t>10/3/14</a:t>
+              <a:t>10/4/14</a:t>
             </a:fld>
             <a:endParaRPr lang="en-US"/>
           </a:p>
@@ -1354,7 +1356,7 @@
           <a:p>
             <a:fld id="{6B8D1CAE-1003-EF41-A6BD-5C2D6A48FE05}" type="datetimeFigureOut">
               <a:rPr lang="en-US" smtClean="0"/>
-              <a:t>10/3/14</a:t>
+              <a:t>10/4/14</a:t>
             </a:fld>
             <a:endParaRPr lang="en-US"/>
           </a:p>
@@ -1776,7 +1778,7 @@
           <a:p>
             <a:fld id="{6B8D1CAE-1003-EF41-A6BD-5C2D6A48FE05}" type="datetimeFigureOut">
               <a:rPr lang="en-US" smtClean="0"/>
-              <a:t>10/3/14</a:t>
+              <a:t>10/4/14</a:t>
             </a:fld>
             <a:endParaRPr lang="en-US"/>
           </a:p>
@@ -1894,7 +1896,7 @@
           <a:p>
             <a:fld id="{6B8D1CAE-1003-EF41-A6BD-5C2D6A48FE05}" type="datetimeFigureOut">
               <a:rPr lang="en-US" smtClean="0"/>
-              <a:t>10/3/14</a:t>
+              <a:t>10/4/14</a:t>
             </a:fld>
             <a:endParaRPr lang="en-US"/>
           </a:p>
@@ -1989,7 +1991,7 @@
           <a:p>
             <a:fld id="{6B8D1CAE-1003-EF41-A6BD-5C2D6A48FE05}" type="datetimeFigureOut">
               <a:rPr lang="en-US" smtClean="0"/>
-              <a:t>10/3/14</a:t>
+              <a:t>10/4/14</a:t>
             </a:fld>
             <a:endParaRPr lang="en-US"/>
           </a:p>
@@ -2266,7 +2268,7 @@
           <a:p>
             <a:fld id="{6B8D1CAE-1003-EF41-A6BD-5C2D6A48FE05}" type="datetimeFigureOut">
               <a:rPr lang="en-US" smtClean="0"/>
-              <a:t>10/3/14</a:t>
+              <a:t>10/4/14</a:t>
             </a:fld>
             <a:endParaRPr lang="en-US"/>
           </a:p>
@@ -2519,7 +2521,7 @@
           <a:p>
             <a:fld id="{6B8D1CAE-1003-EF41-A6BD-5C2D6A48FE05}" type="datetimeFigureOut">
               <a:rPr lang="en-US" smtClean="0"/>
-              <a:t>10/3/14</a:t>
+              <a:t>10/4/14</a:t>
             </a:fld>
             <a:endParaRPr lang="en-US"/>
           </a:p>
@@ -2732,7 +2734,7 @@
           <a:p>
             <a:fld id="{6B8D1CAE-1003-EF41-A6BD-5C2D6A48FE05}" type="datetimeFigureOut">
               <a:rPr lang="en-US" smtClean="0"/>
-              <a:t>10/3/14</a:t>
+              <a:t>10/4/14</a:t>
             </a:fld>
             <a:endParaRPr lang="en-US"/>
           </a:p>
@@ -3124,7 +3126,11 @@
           <a:p>
             <a:r>
               <a:rPr lang="en-US" dirty="0" smtClean="0"/>
-              <a:t>Cloud computing</a:t>
+              <a:t>Cloud </a:t>
+            </a:r>
+            <a:r>
+              <a:rPr lang="en-US" dirty="0" smtClean="0"/>
+              <a:t>computing to do more</a:t>
             </a:r>
             <a:endParaRPr lang="en-US" dirty="0"/>
           </a:p>
@@ -3140,12 +3146,44 @@
             <p:ph idx="1"/>
           </p:nvPr>
         </p:nvSpPr>
-        <p:spPr/>
-        <p:txBody>
-          <a:bodyPr/>
-          <a:lstStyle/>
-          <a:p>
-            <a:endParaRPr lang="en-US"/>
+        <p:spPr>
+          <a:xfrm>
+            <a:off x="457200" y="1600200"/>
+            <a:ext cx="7450604" cy="4525963"/>
+          </a:xfrm>
+        </p:spPr>
+        <p:txBody>
+          <a:bodyPr/>
+          <a:lstStyle/>
+          <a:p>
+            <a:pPr marL="0" indent="0" algn="ctr">
+              <a:buNone/>
+            </a:pPr>
+            <a:r>
+              <a:rPr lang="en-US" dirty="0" smtClean="0"/>
+              <a:t>W. Trimble</a:t>
+            </a:r>
+          </a:p>
+          <a:p>
+            <a:pPr marL="0" indent="0" algn="ctr">
+              <a:buNone/>
+            </a:pPr>
+            <a:endParaRPr lang="en-US" dirty="0" smtClean="0"/>
+          </a:p>
+          <a:p>
+            <a:pPr marL="514350" indent="-514350" algn="ctr">
+              <a:buAutoNum type="arabicPlain" startAt="2014"/>
+            </a:pPr>
+            <a:r>
+              <a:rPr lang="en-US" dirty="0" smtClean="0"/>
+              <a:t>Argonne Soils Workshop </a:t>
+            </a:r>
+          </a:p>
+          <a:p>
+            <a:pPr marL="0" indent="0" algn="ctr">
+              <a:buNone/>
+            </a:pPr>
+            <a:endParaRPr lang="en-US" dirty="0"/>
           </a:p>
         </p:txBody>
       </p:sp>
@@ -3198,13 +3236,11 @@
         </p:nvSpPr>
         <p:spPr/>
         <p:txBody>
-          <a:bodyPr/>
-          <a:lstStyle/>
-          <a:p>
-            <a:r>
-              <a:rPr lang="en-US" dirty="0" smtClean="0"/>
-              <a:t>Why is EC2 so expensive??</a:t>
-            </a:r>
+          <a:bodyPr>
+            <a:normAutofit/>
+          </a:bodyPr>
+          <a:lstStyle/>
+          <a:p>
             <a:endParaRPr lang="en-US" dirty="0"/>
           </a:p>
         </p:txBody>
@@ -3222,65 +3258,122 @@
         <p:spPr/>
         <p:txBody>
           <a:bodyPr>
-            <a:normAutofit fontScale="92500" lnSpcReduction="10000"/>
+            <a:normAutofit fontScale="92500"/>
           </a:bodyPr>
           <a:lstStyle/>
           <a:p>
-            <a:r>
-              <a:rPr lang="en-US" dirty="0" smtClean="0"/>
-              <a:t>They cover </a:t>
-            </a:r>
-            <a:r>
-              <a:rPr lang="en-US" i="1" dirty="0" smtClean="0"/>
-              <a:t>all</a:t>
-            </a:r>
-            <a:r>
-              <a:rPr lang="en-US" dirty="0" smtClean="0"/>
-              <a:t> hardware, power, air conditioning and network costs.</a:t>
-            </a:r>
-          </a:p>
-          <a:p>
+            <a:pPr>
+              <a:buNone/>
+            </a:pPr>
+            <a:r>
+              <a:rPr lang="en-US" b="1" dirty="0" smtClean="0"/>
+              <a:t>1 high-memory </a:t>
+            </a:r>
+            <a:r>
+              <a:rPr lang="en-US" dirty="0" smtClean="0"/>
+              <a:t>quadruple extra-large instance / yr:</a:t>
+            </a:r>
+          </a:p>
+          <a:p>
+            <a:pPr>
+              <a:buNone/>
+            </a:pPr>
             <a:endParaRPr lang="en-US" dirty="0" smtClean="0"/>
           </a:p>
           <a:p>
-            <a:r>
-              <a:rPr lang="en-US" dirty="0" smtClean="0"/>
-              <a:t>That’s actually way more expensive than you think.  (Talk to your </a:t>
-            </a:r>
-            <a:r>
-              <a:rPr lang="en-US" dirty="0" err="1" smtClean="0"/>
-              <a:t>sysadmin</a:t>
-            </a:r>
-            <a:r>
-              <a:rPr lang="en-US" dirty="0" smtClean="0"/>
-              <a:t> or HPC person…)</a:t>
-            </a:r>
-          </a:p>
-          <a:p>
+            <a:pPr>
+              <a:buNone/>
+            </a:pPr>
+            <a:r>
+              <a:rPr lang="en-US" dirty="0" smtClean="0"/>
+              <a:t>68.4 gb of RAM, 8 core @ ~3.2 GHz, 1.7tb of local disk.</a:t>
+            </a:r>
+          </a:p>
+          <a:p>
+            <a:pPr>
+              <a:buNone/>
+            </a:pPr>
             <a:endParaRPr lang="en-US" dirty="0" smtClean="0"/>
           </a:p>
           <a:p>
-            <a:r>
-              <a:rPr lang="en-US" dirty="0" smtClean="0"/>
-              <a:t>They do not operate at 100% capacity, </a:t>
-            </a:r>
-          </a:p>
-          <a:p>
+            <a:pPr>
+              <a:buNone/>
+            </a:pPr>
+            <a:r>
+              <a:rPr lang="en-US" dirty="0" smtClean="0"/>
+              <a:t>$1.64 / hr</a:t>
+            </a:r>
+          </a:p>
+          <a:p>
+            <a:pPr>
+              <a:buNone/>
+            </a:pPr>
+            <a:r>
+              <a:rPr lang="en-US" dirty="0" smtClean="0"/>
+              <a:t>8760 hrs / year</a:t>
+            </a:r>
+          </a:p>
+          <a:p>
+            <a:pPr>
+              <a:buNone/>
+            </a:pPr>
+            <a:r>
+              <a:rPr lang="en-US" dirty="0" smtClean="0"/>
+              <a:t>                         =</a:t>
+            </a:r>
+            <a:r>
+              <a:rPr lang="en-US" dirty="0" smtClean="0"/>
+              <a:t>&gt; $14,400 / year</a:t>
+            </a:r>
+          </a:p>
+          <a:p>
+            <a:pPr>
+              <a:buNone/>
+            </a:pPr>
             <a:endParaRPr lang="en-US" dirty="0" smtClean="0"/>
           </a:p>
           <a:p>
-            <a:r>
-              <a:rPr lang="en-US" dirty="0" smtClean="0"/>
-              <a:t>They want to make $$.</a:t>
-            </a:r>
+            <a:pPr algn="ctr">
+              <a:buNone/>
+            </a:pPr>
+            <a:endParaRPr lang="en-US" dirty="0" smtClean="0"/>
+          </a:p>
+          <a:p>
+            <a:pPr>
+              <a:buNone/>
+            </a:pPr>
             <a:endParaRPr lang="en-US" dirty="0"/>
           </a:p>
         </p:txBody>
       </p:sp>
+      <p:pic>
+        <p:nvPicPr>
+          <p:cNvPr id="4" name="Picture 3"/>
+          <p:cNvPicPr>
+            <a:picLocks noChangeAspect="1"/>
+          </p:cNvPicPr>
+          <p:nvPr/>
+        </p:nvPicPr>
+        <p:blipFill>
+          <a:blip r:embed="rId2"/>
+          <a:stretch>
+            <a:fillRect/>
+          </a:stretch>
+        </p:blipFill>
+        <p:spPr>
+          <a:xfrm>
+            <a:off x="7407554" y="3569900"/>
+            <a:ext cx="1431646" cy="1431646"/>
+          </a:xfrm>
+          <a:prstGeom prst="rect">
+            <a:avLst/>
+          </a:prstGeom>
+        </p:spPr>
+      </p:pic>
     </p:spTree>
     <p:extLst>
       <p:ext uri="{BB962C8B-B14F-4D97-AF65-F5344CB8AC3E}">
-        <p14:creationId xmlns:p14="http://schemas.microsoft.com/office/powerpoint/2010/main" val="3803053694"/>
+        <p14:creationId xmlns:p14="http://schemas.microsoft.com/office/powerpoint/2010/main" val="665008048"/>
       </p:ext>
     </p:extLst>
   </p:cSld>
@@ -3326,114 +3419,155 @@
         </p:nvSpPr>
         <p:spPr/>
         <p:txBody>
-          <a:bodyPr/>
-          <a:lstStyle/>
-          <a:p>
-            <a:r>
-              <a:rPr lang="en-US" dirty="0" smtClean="0"/>
-              <a:t>What are </a:t>
-            </a:r>
+          <a:bodyPr>
+            <a:normAutofit/>
+          </a:bodyPr>
+          <a:lstStyle/>
+          <a:p>
+            <a:endParaRPr lang="en-US" dirty="0"/>
+          </a:p>
+        </p:txBody>
+      </p:sp>
+      <p:sp>
+        <p:nvSpPr>
+          <p:cNvPr id="3" name="Content Placeholder 2"/>
+          <p:cNvSpPr>
+            <a:spLocks noGrp="1"/>
+          </p:cNvSpPr>
+          <p:nvPr>
+            <p:ph idx="1"/>
+          </p:nvPr>
+        </p:nvSpPr>
+        <p:spPr/>
+        <p:txBody>
+          <a:bodyPr>
+            <a:normAutofit fontScale="92500"/>
+          </a:bodyPr>
+          <a:lstStyle/>
+          <a:p>
+            <a:pPr>
+              <a:buNone/>
+            </a:pPr>
             <a:r>
               <a:rPr lang="en-US" b="1" dirty="0" smtClean="0"/>
-              <a:t>we </a:t>
-            </a:r>
-            <a:r>
-              <a:rPr lang="en-US" dirty="0" smtClean="0"/>
-              <a:t>using it for?</a:t>
-            </a:r>
+              <a:t>20 high-CPU extra large machines</a:t>
+            </a:r>
+            <a:r>
+              <a:rPr lang="en-US" dirty="0" smtClean="0"/>
+              <a:t>, for a day:</a:t>
+            </a:r>
+          </a:p>
+          <a:p>
+            <a:pPr>
+              <a:buNone/>
+            </a:pPr>
+            <a:endParaRPr lang="en-US" dirty="0" smtClean="0"/>
+          </a:p>
+          <a:p>
+            <a:pPr>
+              <a:buNone/>
+            </a:pPr>
+            <a:r>
+              <a:rPr lang="en-US" dirty="0" smtClean="0"/>
+              <a:t>7gb of RAM, 8 </a:t>
+            </a:r>
+            <a:r>
+              <a:rPr lang="en-US" dirty="0" err="1" smtClean="0"/>
+              <a:t>x</a:t>
+            </a:r>
+            <a:r>
+              <a:rPr lang="en-US" dirty="0" smtClean="0"/>
+              <a:t> 2.5 GHz CPUs, 1.7tb of local disk.</a:t>
+            </a:r>
+          </a:p>
+          <a:p>
+            <a:pPr>
+              <a:buNone/>
+            </a:pPr>
+            <a:endParaRPr lang="en-US" dirty="0" smtClean="0"/>
+          </a:p>
+          <a:p>
+            <a:pPr>
+              <a:buNone/>
+            </a:pPr>
+            <a:r>
+              <a:rPr lang="en-US" dirty="0" smtClean="0"/>
+              <a:t>$0.58 / hr</a:t>
+            </a:r>
+          </a:p>
+          <a:p>
+            <a:pPr>
+              <a:buNone/>
+            </a:pPr>
+            <a:r>
+              <a:rPr lang="en-US" dirty="0" smtClean="0"/>
+              <a:t>24 hrs / day</a:t>
+            </a:r>
+          </a:p>
+          <a:p>
+            <a:pPr>
+              <a:buNone/>
+            </a:pPr>
+            <a:r>
+              <a:rPr lang="en-US" dirty="0" smtClean="0"/>
+              <a:t>20 machines</a:t>
+            </a:r>
+          </a:p>
+          <a:p>
+            <a:pPr>
+              <a:buNone/>
+            </a:pPr>
+            <a:r>
+              <a:rPr lang="en-US" dirty="0" smtClean="0"/>
+              <a:t>                               =</a:t>
+            </a:r>
+            <a:r>
+              <a:rPr lang="en-US" dirty="0" smtClean="0"/>
+              <a:t>&gt; ~$278/ day.</a:t>
+            </a:r>
+          </a:p>
+          <a:p>
+            <a:pPr>
+              <a:buNone/>
+            </a:pPr>
+            <a:endParaRPr lang="en-US" dirty="0" smtClean="0"/>
+          </a:p>
+          <a:p>
+            <a:pPr>
+              <a:buNone/>
+            </a:pPr>
             <a:endParaRPr lang="en-US" dirty="0"/>
           </a:p>
         </p:txBody>
       </p:sp>
-      <p:sp>
-        <p:nvSpPr>
-          <p:cNvPr id="3" name="Content Placeholder 2"/>
-          <p:cNvSpPr>
-            <a:spLocks noGrp="1"/>
-          </p:cNvSpPr>
-          <p:nvPr>
-            <p:ph idx="1"/>
-          </p:nvPr>
-        </p:nvSpPr>
-        <p:spPr/>
-        <p:txBody>
-          <a:bodyPr>
-            <a:normAutofit fontScale="92500" lnSpcReduction="20000"/>
-          </a:bodyPr>
-          <a:lstStyle/>
-          <a:p>
-            <a:r>
-              <a:rPr lang="en-US" dirty="0" smtClean="0"/>
-              <a:t>Teaching workshops and classes.</a:t>
-            </a:r>
-          </a:p>
-          <a:p>
-            <a:endParaRPr lang="en-US" dirty="0" smtClean="0"/>
-          </a:p>
-          <a:p>
-            <a:r>
-              <a:rPr lang="en-US" dirty="0" smtClean="0"/>
-              <a:t>Running </a:t>
-            </a:r>
-            <a:r>
-              <a:rPr lang="en-US" dirty="0" smtClean="0"/>
-              <a:t>MG-RAST, RAST, and assembly </a:t>
-            </a:r>
-            <a:r>
-              <a:rPr lang="en-US" dirty="0" err="1" smtClean="0"/>
-              <a:t>rast</a:t>
-            </a:r>
-            <a:r>
-              <a:rPr lang="en-US" dirty="0" smtClean="0"/>
-              <a:t> with </a:t>
-            </a:r>
-            <a:r>
-              <a:rPr lang="en-US" dirty="0" err="1" smtClean="0"/>
-              <a:t>kBase</a:t>
-            </a:r>
-            <a:r>
-              <a:rPr lang="en-US" dirty="0" smtClean="0"/>
-              <a:t> </a:t>
-            </a:r>
-            <a:r>
-              <a:rPr lang="en-US" dirty="0" err="1" smtClean="0"/>
-              <a:t>backends</a:t>
-            </a:r>
-            <a:r>
-              <a:rPr lang="en-US" dirty="0" smtClean="0"/>
-              <a:t>.</a:t>
-            </a:r>
-            <a:endParaRPr lang="en-US" dirty="0" smtClean="0"/>
-          </a:p>
-          <a:p>
-            <a:endParaRPr lang="en-US" dirty="0" smtClean="0"/>
-          </a:p>
-          <a:p>
-            <a:r>
-              <a:rPr lang="en-US" dirty="0" smtClean="0"/>
-              <a:t>Scientific computing workhorses without the </a:t>
-            </a:r>
-            <a:r>
-              <a:rPr lang="en-US" dirty="0" err="1" smtClean="0"/>
-              <a:t>sysadmins</a:t>
-            </a:r>
-            <a:endParaRPr lang="en-US" dirty="0" smtClean="0"/>
-          </a:p>
-          <a:p>
-            <a:endParaRPr lang="en-US" dirty="0" smtClean="0"/>
-          </a:p>
-          <a:p>
-            <a:r>
-              <a:rPr lang="en-US" dirty="0" smtClean="0"/>
-              <a:t>Automated testing on clean machines with known software install.</a:t>
-            </a:r>
-          </a:p>
-        </p:txBody>
-      </p:sp>
+      <p:pic>
+        <p:nvPicPr>
+          <p:cNvPr id="4" name="Picture 3"/>
+          <p:cNvPicPr>
+            <a:picLocks noChangeAspect="1"/>
+          </p:cNvPicPr>
+          <p:nvPr/>
+        </p:nvPicPr>
+        <p:blipFill>
+          <a:blip r:embed="rId2"/>
+          <a:stretch>
+            <a:fillRect/>
+          </a:stretch>
+        </p:blipFill>
+        <p:spPr>
+          <a:xfrm>
+            <a:off x="7407554" y="3569900"/>
+            <a:ext cx="1431646" cy="1431646"/>
+          </a:xfrm>
+          <a:prstGeom prst="rect">
+            <a:avLst/>
+          </a:prstGeom>
+        </p:spPr>
+      </p:pic>
     </p:spTree>
     <p:extLst>
       <p:ext uri="{BB962C8B-B14F-4D97-AF65-F5344CB8AC3E}">
-        <p14:creationId xmlns:p14="http://schemas.microsoft.com/office/powerpoint/2010/main" val="2990824871"/>
+        <p14:creationId xmlns:p14="http://schemas.microsoft.com/office/powerpoint/2010/main" val="3791175417"/>
       </p:ext>
     </p:extLst>
   </p:cSld>
@@ -3484,6 +3618,333 @@
           <a:p>
             <a:r>
               <a:rPr lang="en-US" dirty="0" smtClean="0"/>
+              <a:t>Why is EC2 so expensive??</a:t>
+            </a:r>
+            <a:endParaRPr lang="en-US" dirty="0"/>
+          </a:p>
+        </p:txBody>
+      </p:sp>
+      <p:sp>
+        <p:nvSpPr>
+          <p:cNvPr id="3" name="Content Placeholder 2"/>
+          <p:cNvSpPr>
+            <a:spLocks noGrp="1"/>
+          </p:cNvSpPr>
+          <p:nvPr>
+            <p:ph idx="1"/>
+          </p:nvPr>
+        </p:nvSpPr>
+        <p:spPr/>
+        <p:txBody>
+          <a:bodyPr>
+            <a:normAutofit fontScale="92500" lnSpcReduction="10000"/>
+          </a:bodyPr>
+          <a:lstStyle/>
+          <a:p>
+            <a:r>
+              <a:rPr lang="en-US" dirty="0" smtClean="0"/>
+              <a:t>They cover </a:t>
+            </a:r>
+            <a:r>
+              <a:rPr lang="en-US" i="1" dirty="0" smtClean="0"/>
+              <a:t>all</a:t>
+            </a:r>
+            <a:r>
+              <a:rPr lang="en-US" dirty="0" smtClean="0"/>
+              <a:t> hardware, power, air conditioning and network costs.</a:t>
+            </a:r>
+          </a:p>
+          <a:p>
+            <a:endParaRPr lang="en-US" dirty="0" smtClean="0"/>
+          </a:p>
+          <a:p>
+            <a:r>
+              <a:rPr lang="en-US" dirty="0" smtClean="0"/>
+              <a:t>That’s actually way more expensive than you think.  (Talk to your </a:t>
+            </a:r>
+            <a:r>
+              <a:rPr lang="en-US" dirty="0" err="1" smtClean="0"/>
+              <a:t>sysadmin</a:t>
+            </a:r>
+            <a:r>
+              <a:rPr lang="en-US" dirty="0" smtClean="0"/>
+              <a:t> or HPC person…)</a:t>
+            </a:r>
+          </a:p>
+          <a:p>
+            <a:endParaRPr lang="en-US" dirty="0" smtClean="0"/>
+          </a:p>
+          <a:p>
+            <a:r>
+              <a:rPr lang="en-US" dirty="0" smtClean="0"/>
+              <a:t>They do not operate at 100% capacity, </a:t>
+            </a:r>
+          </a:p>
+          <a:p>
+            <a:endParaRPr lang="en-US" dirty="0" smtClean="0"/>
+          </a:p>
+          <a:p>
+            <a:r>
+              <a:rPr lang="en-US" dirty="0" smtClean="0"/>
+              <a:t>They want to make $$.</a:t>
+            </a:r>
+            <a:endParaRPr lang="en-US" dirty="0"/>
+          </a:p>
+        </p:txBody>
+      </p:sp>
+      <p:pic>
+        <p:nvPicPr>
+          <p:cNvPr id="4" name="Picture 3"/>
+          <p:cNvPicPr>
+            <a:picLocks noChangeAspect="1"/>
+          </p:cNvPicPr>
+          <p:nvPr/>
+        </p:nvPicPr>
+        <p:blipFill>
+          <a:blip r:embed="rId2"/>
+          <a:stretch>
+            <a:fillRect/>
+          </a:stretch>
+        </p:blipFill>
+        <p:spPr>
+          <a:xfrm>
+            <a:off x="4565650" y="5003800"/>
+            <a:ext cx="4381500" cy="1854200"/>
+          </a:xfrm>
+          <a:prstGeom prst="rect">
+            <a:avLst/>
+          </a:prstGeom>
+        </p:spPr>
+      </p:pic>
+    </p:spTree>
+    <p:extLst>
+      <p:ext uri="{BB962C8B-B14F-4D97-AF65-F5344CB8AC3E}">
+        <p14:creationId xmlns:p14="http://schemas.microsoft.com/office/powerpoint/2010/main" val="3803053694"/>
+      </p:ext>
+    </p:extLst>
+  </p:cSld>
+  <p:clrMapOvr>
+    <a:masterClrMapping/>
+  </p:clrMapOvr>
+  <p:timing>
+    <p:tnLst>
+      <p:par>
+        <p:cTn xmlns:p14="http://schemas.microsoft.com/office/powerpoint/2010/main" id="1" dur="indefinite" restart="never" nodeType="tmRoot"/>
+      </p:par>
+    </p:tnLst>
+  </p:timing>
+</p:sld>
+</file>
+
+<file path=ppt/slides/slide13.xml><?xml version="1.0" encoding="utf-8"?>
+<p:sld xmlns:a="http://schemas.openxmlformats.org/drawingml/2006/main" xmlns:r="http://schemas.openxmlformats.org/officeDocument/2006/relationships" xmlns:p="http://schemas.openxmlformats.org/presentationml/2006/main">
+  <p:cSld>
+    <p:spTree>
+      <p:nvGrpSpPr>
+        <p:cNvPr id="1" name=""/>
+        <p:cNvGrpSpPr/>
+        <p:nvPr/>
+      </p:nvGrpSpPr>
+      <p:grpSpPr>
+        <a:xfrm>
+          <a:off x="0" y="0"/>
+          <a:ext cx="0" cy="0"/>
+          <a:chOff x="0" y="0"/>
+          <a:chExt cx="0" cy="0"/>
+        </a:xfrm>
+      </p:grpSpPr>
+      <p:sp>
+        <p:nvSpPr>
+          <p:cNvPr id="2" name="Title 1"/>
+          <p:cNvSpPr>
+            <a:spLocks noGrp="1"/>
+          </p:cNvSpPr>
+          <p:nvPr>
+            <p:ph type="title"/>
+          </p:nvPr>
+        </p:nvSpPr>
+        <p:spPr>
+          <a:xfrm>
+            <a:off x="457200" y="24469"/>
+            <a:ext cx="8229600" cy="1143000"/>
+          </a:xfrm>
+        </p:spPr>
+        <p:txBody>
+          <a:bodyPr/>
+          <a:lstStyle/>
+          <a:p>
+            <a:r>
+              <a:rPr lang="en-US" dirty="0" smtClean="0"/>
+              <a:t>What are </a:t>
+            </a:r>
+            <a:r>
+              <a:rPr lang="en-US" b="1" dirty="0" smtClean="0"/>
+              <a:t>we </a:t>
+            </a:r>
+            <a:r>
+              <a:rPr lang="en-US" dirty="0" smtClean="0"/>
+              <a:t>using it for?</a:t>
+            </a:r>
+            <a:endParaRPr lang="en-US" dirty="0"/>
+          </a:p>
+        </p:txBody>
+      </p:sp>
+      <p:sp>
+        <p:nvSpPr>
+          <p:cNvPr id="3" name="Content Placeholder 2"/>
+          <p:cNvSpPr>
+            <a:spLocks noGrp="1"/>
+          </p:cNvSpPr>
+          <p:nvPr>
+            <p:ph idx="1"/>
+          </p:nvPr>
+        </p:nvSpPr>
+        <p:spPr>
+          <a:xfrm>
+            <a:off x="173164" y="1042130"/>
+            <a:ext cx="8970836" cy="4525963"/>
+          </a:xfrm>
+        </p:spPr>
+        <p:txBody>
+          <a:bodyPr>
+            <a:noAutofit/>
+          </a:bodyPr>
+          <a:lstStyle/>
+          <a:p>
+            <a:pPr>
+              <a:lnSpc>
+                <a:spcPct val="150000"/>
+              </a:lnSpc>
+            </a:pPr>
+            <a:r>
+              <a:rPr lang="en-US" dirty="0" smtClean="0"/>
+              <a:t>Teaching workshops and classes</a:t>
+            </a:r>
+            <a:r>
+              <a:rPr lang="en-US" dirty="0" smtClean="0"/>
+              <a:t>.</a:t>
+            </a:r>
+            <a:endParaRPr lang="en-US" dirty="0" smtClean="0"/>
+          </a:p>
+          <a:p>
+            <a:pPr>
+              <a:lnSpc>
+                <a:spcPct val="150000"/>
+              </a:lnSpc>
+            </a:pPr>
+            <a:r>
+              <a:rPr lang="en-US" dirty="0" smtClean="0"/>
+              <a:t>Running MG-RAST, RAST, and assembly </a:t>
+            </a:r>
+            <a:r>
+              <a:rPr lang="en-US" dirty="0" err="1" smtClean="0"/>
+              <a:t>rast</a:t>
+            </a:r>
+            <a:r>
+              <a:rPr lang="en-US" dirty="0" smtClean="0"/>
+              <a:t> with </a:t>
+            </a:r>
+            <a:r>
+              <a:rPr lang="en-US" dirty="0" err="1" smtClean="0"/>
+              <a:t>kBase</a:t>
+            </a:r>
+            <a:r>
+              <a:rPr lang="en-US" dirty="0" smtClean="0"/>
+              <a:t> </a:t>
+            </a:r>
+            <a:r>
+              <a:rPr lang="en-US" dirty="0" err="1" smtClean="0"/>
+              <a:t>backends</a:t>
+            </a:r>
+            <a:r>
+              <a:rPr lang="en-US" dirty="0" smtClean="0"/>
+              <a:t>.</a:t>
+            </a:r>
+            <a:endParaRPr lang="en-US" dirty="0" smtClean="0"/>
+          </a:p>
+          <a:p>
+            <a:pPr>
+              <a:lnSpc>
+                <a:spcPct val="150000"/>
+              </a:lnSpc>
+            </a:pPr>
+            <a:r>
+              <a:rPr lang="en-US" dirty="0" smtClean="0"/>
+              <a:t>Scientific computing workhorses without the </a:t>
+            </a:r>
+            <a:r>
+              <a:rPr lang="en-US" dirty="0" err="1" smtClean="0"/>
+              <a:t>sysadmins</a:t>
+            </a:r>
+            <a:endParaRPr lang="en-US" dirty="0" smtClean="0"/>
+          </a:p>
+          <a:p>
+            <a:pPr>
+              <a:lnSpc>
+                <a:spcPct val="150000"/>
+              </a:lnSpc>
+            </a:pPr>
+            <a:r>
+              <a:rPr lang="en-US" dirty="0" smtClean="0"/>
+              <a:t>Automated testing on clean machines with known software install.</a:t>
+            </a:r>
+          </a:p>
+        </p:txBody>
+      </p:sp>
+    </p:spTree>
+    <p:extLst>
+      <p:ext uri="{BB962C8B-B14F-4D97-AF65-F5344CB8AC3E}">
+        <p14:creationId xmlns:p14="http://schemas.microsoft.com/office/powerpoint/2010/main" val="2990824871"/>
+      </p:ext>
+    </p:extLst>
+  </p:cSld>
+  <p:clrMapOvr>
+    <a:masterClrMapping/>
+  </p:clrMapOvr>
+  <p:timing>
+    <p:tnLst>
+      <p:par>
+        <p:cTn xmlns:p14="http://schemas.microsoft.com/office/powerpoint/2010/main" id="1" dur="indefinite" restart="never" nodeType="tmRoot"/>
+      </p:par>
+    </p:tnLst>
+  </p:timing>
+</p:sld>
+</file>
+
+<file path=ppt/slides/slide14.xml><?xml version="1.0" encoding="utf-8"?>
+<p:sld xmlns:a="http://schemas.openxmlformats.org/drawingml/2006/main" xmlns:r="http://schemas.openxmlformats.org/officeDocument/2006/relationships" xmlns:p="http://schemas.openxmlformats.org/presentationml/2006/main">
+  <p:cSld>
+    <p:spTree>
+      <p:nvGrpSpPr>
+        <p:cNvPr id="1" name=""/>
+        <p:cNvGrpSpPr/>
+        <p:nvPr/>
+      </p:nvGrpSpPr>
+      <p:grpSpPr>
+        <a:xfrm>
+          <a:off x="0" y="0"/>
+          <a:ext cx="0" cy="0"/>
+          <a:chOff x="0" y="0"/>
+          <a:chExt cx="0" cy="0"/>
+        </a:xfrm>
+      </p:grpSpPr>
+      <p:sp>
+        <p:nvSpPr>
+          <p:cNvPr id="2" name="Title 1"/>
+          <p:cNvSpPr>
+            <a:spLocks noGrp="1"/>
+          </p:cNvSpPr>
+          <p:nvPr>
+            <p:ph type="title"/>
+          </p:nvPr>
+        </p:nvSpPr>
+        <p:spPr/>
+        <p:txBody>
+          <a:bodyPr/>
+          <a:lstStyle/>
+          <a:p>
+            <a:r>
+              <a:rPr lang="en-US" dirty="0" smtClean="0"/>
               <a:t>Today’s tutorials</a:t>
             </a:r>
             <a:endParaRPr lang="en-US" dirty="0"/>
@@ -3512,17 +3973,8 @@
             </a:pPr>
             <a:r>
               <a:rPr lang="en-US" dirty="0" smtClean="0"/>
-              <a:t>Log in to a new (blank) machine </a:t>
-            </a:r>
-            <a:r>
-              <a:rPr lang="en-US" dirty="0" smtClean="0"/>
-              <a:t>from Amazon</a:t>
-            </a:r>
-            <a:r>
-              <a:rPr lang="en-US" dirty="0" smtClean="0"/>
-              <a:t>.  (We have provided these for you).</a:t>
-            </a:r>
-            <a:endParaRPr lang="en-US" dirty="0" smtClean="0"/>
+              <a:t>Log in to a new (blank) machine from Amazon.  (We have provided these for you).</a:t>
+            </a:r>
           </a:p>
           <a:p>
             <a:pPr marL="514350" indent="-514350">
@@ -3639,7 +4091,7 @@
 </p:sld>
 </file>
 
-<file path=ppt/slides/slide13.xml><?xml version="1.0" encoding="utf-8"?>
+<file path=ppt/slides/slide15.xml><?xml version="1.0" encoding="utf-8"?>
 <p:sld xmlns:a="http://schemas.openxmlformats.org/drawingml/2006/main" xmlns:r="http://schemas.openxmlformats.org/officeDocument/2006/relationships" xmlns:p="http://schemas.openxmlformats.org/presentationml/2006/main">
   <p:cSld>
     <p:spTree>
@@ -3841,8 +4293,23 @@
             </a:pPr>
             <a:r>
               <a:rPr lang="en-US" dirty="0" smtClean="0"/>
-              <a:t>Run short-read aligner BWA</a:t>
-            </a:r>
+              <a:t>Run short-read aligner </a:t>
+            </a:r>
+            <a:r>
+              <a:rPr lang="en-US" dirty="0" smtClean="0"/>
+              <a:t>BWA</a:t>
+            </a:r>
+          </a:p>
+          <a:p>
+            <a:pPr marL="514350" indent="-514350">
+              <a:buFont typeface="Arial"/>
+              <a:buAutoNum type="arabicPeriod"/>
+            </a:pPr>
+            <a:r>
+              <a:rPr lang="en-US" dirty="0" smtClean="0"/>
+              <a:t>Visualize the result</a:t>
+            </a:r>
+            <a:endParaRPr lang="en-US" dirty="0" smtClean="0"/>
           </a:p>
           <a:p>
             <a:pPr marL="514350" indent="-514350">
@@ -3930,6 +4397,242 @@
             <p:ph type="title"/>
           </p:nvPr>
         </p:nvSpPr>
+        <p:spPr/>
+        <p:txBody>
+          <a:bodyPr/>
+          <a:lstStyle/>
+          <a:p>
+            <a:r>
+              <a:rPr lang="en-US" dirty="0" smtClean="0"/>
+              <a:t>Cloud </a:t>
+            </a:r>
+            <a:r>
+              <a:rPr lang="en-US" dirty="0" smtClean="0"/>
+              <a:t>computing to do more</a:t>
+            </a:r>
+            <a:endParaRPr lang="en-US" dirty="0"/>
+          </a:p>
+        </p:txBody>
+      </p:sp>
+      <p:sp>
+        <p:nvSpPr>
+          <p:cNvPr id="3" name="Content Placeholder 2"/>
+          <p:cNvSpPr>
+            <a:spLocks noGrp="1"/>
+          </p:cNvSpPr>
+          <p:nvPr>
+            <p:ph idx="1"/>
+          </p:nvPr>
+        </p:nvSpPr>
+        <p:spPr>
+          <a:xfrm>
+            <a:off x="457200" y="1600200"/>
+            <a:ext cx="7450604" cy="4525963"/>
+          </a:xfrm>
+        </p:spPr>
+        <p:txBody>
+          <a:bodyPr/>
+          <a:lstStyle/>
+          <a:p>
+            <a:pPr marL="0" indent="0" algn="ctr">
+              <a:buNone/>
+            </a:pPr>
+            <a:r>
+              <a:rPr lang="en-US" dirty="0" smtClean="0"/>
+              <a:t>W. Trimble</a:t>
+            </a:r>
+          </a:p>
+          <a:p>
+            <a:pPr marL="0" indent="0" algn="ctr">
+              <a:buNone/>
+            </a:pPr>
+            <a:endParaRPr lang="en-US" dirty="0" smtClean="0"/>
+          </a:p>
+          <a:p>
+            <a:pPr marL="0" indent="0" algn="ctr">
+              <a:buNone/>
+            </a:pPr>
+            <a:r>
+              <a:rPr lang="en-US" dirty="0" smtClean="0"/>
+              <a:t>2014  Argonne Soils Workshop </a:t>
+            </a:r>
+          </a:p>
+          <a:p>
+            <a:pPr marL="0" indent="0" algn="ctr">
+              <a:buNone/>
+            </a:pPr>
+            <a:endParaRPr lang="en-US" dirty="0"/>
+          </a:p>
+          <a:p>
+            <a:pPr marL="0" indent="0" algn="ctr">
+              <a:buNone/>
+            </a:pPr>
+            <a:r>
+              <a:rPr lang="en-US" dirty="0" smtClean="0"/>
+              <a:t>Saturday afternoon—really, guys?</a:t>
+            </a:r>
+            <a:endParaRPr lang="en-US" dirty="0"/>
+          </a:p>
+        </p:txBody>
+      </p:sp>
+    </p:spTree>
+    <p:extLst>
+      <p:ext uri="{BB962C8B-B14F-4D97-AF65-F5344CB8AC3E}">
+        <p14:creationId xmlns:p14="http://schemas.microsoft.com/office/powerpoint/2010/main" val="3277789774"/>
+      </p:ext>
+    </p:extLst>
+  </p:cSld>
+  <p:clrMapOvr>
+    <a:masterClrMapping/>
+  </p:clrMapOvr>
+  <p:timing>
+    <p:tnLst>
+      <p:par>
+        <p:cTn xmlns:p14="http://schemas.microsoft.com/office/powerpoint/2010/main" id="1" dur="indefinite" restart="never" nodeType="tmRoot"/>
+      </p:par>
+    </p:tnLst>
+  </p:timing>
+</p:sld>
+</file>
+
+<file path=ppt/slides/slide3.xml><?xml version="1.0" encoding="utf-8"?>
+<p:sld xmlns:a="http://schemas.openxmlformats.org/drawingml/2006/main" xmlns:r="http://schemas.openxmlformats.org/officeDocument/2006/relationships" xmlns:p="http://schemas.openxmlformats.org/presentationml/2006/main">
+  <p:cSld>
+    <p:spTree>
+      <p:nvGrpSpPr>
+        <p:cNvPr id="1" name=""/>
+        <p:cNvGrpSpPr/>
+        <p:nvPr/>
+      </p:nvGrpSpPr>
+      <p:grpSpPr>
+        <a:xfrm>
+          <a:off x="0" y="0"/>
+          <a:ext cx="0" cy="0"/>
+          <a:chOff x="0" y="0"/>
+          <a:chExt cx="0" cy="0"/>
+        </a:xfrm>
+      </p:grpSpPr>
+      <p:sp>
+        <p:nvSpPr>
+          <p:cNvPr id="2" name="Title 1"/>
+          <p:cNvSpPr>
+            <a:spLocks noGrp="1"/>
+          </p:cNvSpPr>
+          <p:nvPr>
+            <p:ph type="title"/>
+          </p:nvPr>
+        </p:nvSpPr>
+        <p:spPr/>
+        <p:txBody>
+          <a:bodyPr/>
+          <a:lstStyle/>
+          <a:p>
+            <a:r>
+              <a:rPr lang="en-US" dirty="0" smtClean="0"/>
+              <a:t>What problems </a:t>
+            </a:r>
+            <a:r>
+              <a:rPr lang="en-US" dirty="0" smtClean="0"/>
+              <a:t>does this solve?</a:t>
+            </a:r>
+            <a:endParaRPr lang="en-US" dirty="0"/>
+          </a:p>
+        </p:txBody>
+      </p:sp>
+      <p:sp>
+        <p:nvSpPr>
+          <p:cNvPr id="3" name="Content Placeholder 2"/>
+          <p:cNvSpPr>
+            <a:spLocks noGrp="1"/>
+          </p:cNvSpPr>
+          <p:nvPr>
+            <p:ph idx="1"/>
+          </p:nvPr>
+        </p:nvSpPr>
+        <p:spPr/>
+        <p:txBody>
+          <a:bodyPr>
+            <a:noAutofit/>
+          </a:bodyPr>
+          <a:lstStyle/>
+          <a:p>
+            <a:r>
+              <a:rPr lang="en-US" sz="3600" dirty="0" smtClean="0"/>
+              <a:t>“The classroom problem” everyone clicks “submit at the same time-&gt; crashes servers</a:t>
+            </a:r>
+          </a:p>
+          <a:p>
+            <a:r>
+              <a:rPr lang="en-US" sz="3600" dirty="0" smtClean="0"/>
+              <a:t>Data too big to process on your laptop.</a:t>
+            </a:r>
+          </a:p>
+          <a:p>
+            <a:r>
+              <a:rPr lang="en-US" sz="3600" dirty="0" smtClean="0"/>
+              <a:t>Campus cluster is down for maintenance</a:t>
+            </a:r>
+          </a:p>
+          <a:p>
+            <a:r>
+              <a:rPr lang="en-US" sz="3600" dirty="0" smtClean="0"/>
+              <a:t>Data analysis takes too lon</a:t>
+            </a:r>
+            <a:r>
+              <a:rPr lang="en-US" sz="3600" dirty="0" smtClean="0"/>
+              <a:t>g on one computer.</a:t>
+            </a:r>
+            <a:endParaRPr lang="en-US" sz="3600" dirty="0"/>
+          </a:p>
+        </p:txBody>
+      </p:sp>
+    </p:spTree>
+    <p:extLst>
+      <p:ext uri="{BB962C8B-B14F-4D97-AF65-F5344CB8AC3E}">
+        <p14:creationId xmlns:p14="http://schemas.microsoft.com/office/powerpoint/2010/main" val="3604155525"/>
+      </p:ext>
+    </p:extLst>
+  </p:cSld>
+  <p:clrMapOvr>
+    <a:masterClrMapping/>
+  </p:clrMapOvr>
+  <p:timing>
+    <p:tnLst>
+      <p:par>
+        <p:cTn xmlns:p14="http://schemas.microsoft.com/office/powerpoint/2010/main" id="1" dur="indefinite" restart="never" nodeType="tmRoot"/>
+      </p:par>
+    </p:tnLst>
+  </p:timing>
+</p:sld>
+</file>
+
+<file path=ppt/slides/slide4.xml><?xml version="1.0" encoding="utf-8"?>
+<p:sld xmlns:a="http://schemas.openxmlformats.org/drawingml/2006/main" xmlns:r="http://schemas.openxmlformats.org/officeDocument/2006/relationships" xmlns:p="http://schemas.openxmlformats.org/presentationml/2006/main">
+  <p:cSld>
+    <p:spTree>
+      <p:nvGrpSpPr>
+        <p:cNvPr id="1" name=""/>
+        <p:cNvGrpSpPr/>
+        <p:nvPr/>
+      </p:nvGrpSpPr>
+      <p:grpSpPr>
+        <a:xfrm>
+          <a:off x="0" y="0"/>
+          <a:ext cx="0" cy="0"/>
+          <a:chOff x="0" y="0"/>
+          <a:chExt cx="0" cy="0"/>
+        </a:xfrm>
+      </p:grpSpPr>
+      <p:sp>
+        <p:nvSpPr>
+          <p:cNvPr id="2" name="Title 1"/>
+          <p:cNvSpPr>
+            <a:spLocks noGrp="1"/>
+          </p:cNvSpPr>
+          <p:nvPr>
+            <p:ph type="title"/>
+          </p:nvPr>
+        </p:nvSpPr>
         <p:spPr>
           <a:xfrm>
             <a:off x="457200" y="33337"/>
@@ -4040,7 +4743,7 @@
 </p:sld>
 </file>
 
-<file path=ppt/slides/slide3.xml><?xml version="1.0" encoding="utf-8"?>
+<file path=ppt/slides/slide5.xml><?xml version="1.0" encoding="utf-8"?>
 <p:sld xmlns:a="http://schemas.openxmlformats.org/drawingml/2006/main" xmlns:r="http://schemas.openxmlformats.org/officeDocument/2006/relationships" xmlns:p="http://schemas.openxmlformats.org/presentationml/2006/main">
   <p:cSld>
     <p:spTree>
@@ -4188,7 +4891,7 @@
 </p:sld>
 </file>
 
-<file path=ppt/slides/slide4.xml><?xml version="1.0" encoding="utf-8"?>
+<file path=ppt/slides/slide6.xml><?xml version="1.0" encoding="utf-8"?>
 <p:sld xmlns:a="http://schemas.openxmlformats.org/drawingml/2006/main" xmlns:r="http://schemas.openxmlformats.org/officeDocument/2006/relationships" xmlns:p="http://schemas.openxmlformats.org/presentationml/2006/main">
   <p:cSld>
     <p:spTree>
@@ -4286,214 +4989,6 @@
 </p:sld>
 </file>
 
-<file path=ppt/slides/slide5.xml><?xml version="1.0" encoding="utf-8"?>
-<p:sld xmlns:a="http://schemas.openxmlformats.org/drawingml/2006/main" xmlns:r="http://schemas.openxmlformats.org/officeDocument/2006/relationships" xmlns:p="http://schemas.openxmlformats.org/presentationml/2006/main">
-  <p:cSld>
-    <p:spTree>
-      <p:nvGrpSpPr>
-        <p:cNvPr id="1" name=""/>
-        <p:cNvGrpSpPr/>
-        <p:nvPr/>
-      </p:nvGrpSpPr>
-      <p:grpSpPr>
-        <a:xfrm>
-          <a:off x="0" y="0"/>
-          <a:ext cx="0" cy="0"/>
-          <a:chOff x="0" y="0"/>
-          <a:chExt cx="0" cy="0"/>
-        </a:xfrm>
-      </p:grpSpPr>
-      <p:sp>
-        <p:nvSpPr>
-          <p:cNvPr id="2" name="Title 1"/>
-          <p:cNvSpPr>
-            <a:spLocks noGrp="1"/>
-          </p:cNvSpPr>
-          <p:nvPr>
-            <p:ph type="title"/>
-          </p:nvPr>
-        </p:nvSpPr>
-        <p:spPr/>
-        <p:txBody>
-          <a:bodyPr>
-            <a:normAutofit fontScale="90000"/>
-          </a:bodyPr>
-          <a:lstStyle/>
-          <a:p>
-            <a:r>
-              <a:rPr lang="en-US" dirty="0" smtClean="0"/>
-              <a:t>Amazon is a major cloud computing provider</a:t>
-            </a:r>
-            <a:endParaRPr lang="en-US" dirty="0"/>
-          </a:p>
-        </p:txBody>
-      </p:sp>
-      <p:sp>
-        <p:nvSpPr>
-          <p:cNvPr id="3" name="Content Placeholder 2"/>
-          <p:cNvSpPr>
-            <a:spLocks noGrp="1"/>
-          </p:cNvSpPr>
-          <p:nvPr>
-            <p:ph idx="1"/>
-          </p:nvPr>
-        </p:nvSpPr>
-        <p:spPr/>
-        <p:txBody>
-          <a:bodyPr>
-            <a:normAutofit/>
-          </a:bodyPr>
-          <a:lstStyle/>
-          <a:p>
-            <a:r>
-              <a:rPr lang="en-US" sz="3600" dirty="0" smtClean="0"/>
-              <a:t>Did you know they rent computers!?</a:t>
-            </a:r>
-          </a:p>
-          <a:p>
-            <a:endParaRPr lang="en-US" sz="3600" dirty="0" smtClean="0"/>
-          </a:p>
-          <a:p>
-            <a:r>
-              <a:rPr lang="en-US" sz="3600" dirty="0" smtClean="0"/>
-              <a:t>Rumors are that it’s more lucrative than their book selling division…</a:t>
-            </a:r>
-            <a:endParaRPr lang="en-US" sz="3600" dirty="0"/>
-          </a:p>
-        </p:txBody>
-      </p:sp>
-    </p:spTree>
-    <p:extLst>
-      <p:ext uri="{BB962C8B-B14F-4D97-AF65-F5344CB8AC3E}">
-        <p14:creationId xmlns:p14="http://schemas.microsoft.com/office/powerpoint/2010/main" val="752438481"/>
-      </p:ext>
-    </p:extLst>
-  </p:cSld>
-  <p:clrMapOvr>
-    <a:masterClrMapping/>
-  </p:clrMapOvr>
-  <p:timing>
-    <p:tnLst>
-      <p:par>
-        <p:cTn xmlns:p14="http://schemas.microsoft.com/office/powerpoint/2010/main" id="1" dur="indefinite" restart="never" nodeType="tmRoot"/>
-      </p:par>
-    </p:tnLst>
-  </p:timing>
-</p:sld>
-</file>
-
-<file path=ppt/slides/slide6.xml><?xml version="1.0" encoding="utf-8"?>
-<p:sld xmlns:a="http://schemas.openxmlformats.org/drawingml/2006/main" xmlns:r="http://schemas.openxmlformats.org/officeDocument/2006/relationships" xmlns:p="http://schemas.openxmlformats.org/presentationml/2006/main">
-  <p:cSld>
-    <p:spTree>
-      <p:nvGrpSpPr>
-        <p:cNvPr id="1" name=""/>
-        <p:cNvGrpSpPr/>
-        <p:nvPr/>
-      </p:nvGrpSpPr>
-      <p:grpSpPr>
-        <a:xfrm>
-          <a:off x="0" y="0"/>
-          <a:ext cx="0" cy="0"/>
-          <a:chOff x="0" y="0"/>
-          <a:chExt cx="0" cy="0"/>
-        </a:xfrm>
-      </p:grpSpPr>
-      <p:sp>
-        <p:nvSpPr>
-          <p:cNvPr id="2" name="Title 1"/>
-          <p:cNvSpPr>
-            <a:spLocks noGrp="1"/>
-          </p:cNvSpPr>
-          <p:nvPr>
-            <p:ph type="title"/>
-          </p:nvPr>
-        </p:nvSpPr>
-        <p:spPr/>
-        <p:txBody>
-          <a:bodyPr/>
-          <a:lstStyle/>
-          <a:p>
-            <a:r>
-              <a:rPr lang="en-US" dirty="0" smtClean="0"/>
-              <a:t>Terms</a:t>
-            </a:r>
-            <a:endParaRPr lang="en-US" dirty="0"/>
-          </a:p>
-        </p:txBody>
-      </p:sp>
-      <p:sp>
-        <p:nvSpPr>
-          <p:cNvPr id="3" name="Content Placeholder 2"/>
-          <p:cNvSpPr>
-            <a:spLocks noGrp="1"/>
-          </p:cNvSpPr>
-          <p:nvPr>
-            <p:ph idx="1"/>
-          </p:nvPr>
-        </p:nvSpPr>
-        <p:spPr/>
-        <p:txBody>
-          <a:bodyPr/>
-          <a:lstStyle/>
-          <a:p>
-            <a:pPr>
-              <a:buNone/>
-            </a:pPr>
-            <a:r>
-              <a:rPr lang="en-US" sz="3600" dirty="0" smtClean="0"/>
-              <a:t>EC2 – Elastic Cloud Computing, computer rental from Amazon.</a:t>
-            </a:r>
-          </a:p>
-          <a:p>
-            <a:pPr>
-              <a:buNone/>
-            </a:pPr>
-            <a:endParaRPr lang="en-US" sz="3600" dirty="0" smtClean="0"/>
-          </a:p>
-          <a:p>
-            <a:pPr>
-              <a:buNone/>
-            </a:pPr>
-            <a:r>
-              <a:rPr lang="en-US" sz="3600" dirty="0" smtClean="0"/>
-              <a:t>EBS – Elastic Block Storage, virtual hard drive rental from Amazon.</a:t>
-            </a:r>
-          </a:p>
-          <a:p>
-            <a:pPr>
-              <a:buNone/>
-            </a:pPr>
-            <a:endParaRPr lang="en-US" dirty="0" smtClean="0"/>
-          </a:p>
-          <a:p>
-            <a:pPr>
-              <a:buNone/>
-            </a:pPr>
-            <a:endParaRPr lang="en-US" dirty="0"/>
-          </a:p>
-        </p:txBody>
-      </p:sp>
-    </p:spTree>
-    <p:extLst>
-      <p:ext uri="{BB962C8B-B14F-4D97-AF65-F5344CB8AC3E}">
-        <p14:creationId xmlns:p14="http://schemas.microsoft.com/office/powerpoint/2010/main" val="3925019170"/>
-      </p:ext>
-    </p:extLst>
-  </p:cSld>
-  <p:clrMapOvr>
-    <a:masterClrMapping/>
-  </p:clrMapOvr>
-  <p:timing>
-    <p:tnLst>
-      <p:par>
-        <p:cTn xmlns:p14="http://schemas.microsoft.com/office/powerpoint/2010/main" id="1" dur="indefinite" restart="never" nodeType="tmRoot"/>
-      </p:par>
-    </p:tnLst>
-  </p:timing>
-</p:sld>
-</file>
-
 <file path=ppt/slides/slide7.xml><?xml version="1.0" encoding="utf-8"?>
 <p:sld xmlns:a="http://schemas.openxmlformats.org/drawingml/2006/main" xmlns:r="http://schemas.openxmlformats.org/officeDocument/2006/relationships" xmlns:p="http://schemas.openxmlformats.org/presentationml/2006/main">
   <p:cSld>
@@ -4524,119 +5019,80 @@
         <p:spPr/>
         <p:txBody>
           <a:bodyPr>
+            <a:normAutofit fontScale="90000"/>
+          </a:bodyPr>
+          <a:lstStyle/>
+          <a:p>
+            <a:r>
+              <a:rPr lang="en-US" dirty="0" smtClean="0"/>
+              <a:t>Amazon is a major cloud computing provider</a:t>
+            </a:r>
+            <a:endParaRPr lang="en-US" dirty="0"/>
+          </a:p>
+        </p:txBody>
+      </p:sp>
+      <p:sp>
+        <p:nvSpPr>
+          <p:cNvPr id="3" name="Content Placeholder 2"/>
+          <p:cNvSpPr>
+            <a:spLocks noGrp="1"/>
+          </p:cNvSpPr>
+          <p:nvPr>
+            <p:ph idx="1"/>
+          </p:nvPr>
+        </p:nvSpPr>
+        <p:spPr/>
+        <p:txBody>
+          <a:bodyPr>
             <a:normAutofit/>
           </a:bodyPr>
           <a:lstStyle/>
           <a:p>
             <a:r>
-              <a:rPr lang="en-US" dirty="0" smtClean="0"/>
-              <a:t>Some quick calculations:</a:t>
-            </a:r>
-            <a:endParaRPr lang="en-US" dirty="0"/>
-          </a:p>
-        </p:txBody>
-      </p:sp>
-      <p:sp>
-        <p:nvSpPr>
-          <p:cNvPr id="3" name="Content Placeholder 2"/>
-          <p:cNvSpPr>
-            <a:spLocks noGrp="1"/>
-          </p:cNvSpPr>
-          <p:nvPr>
-            <p:ph idx="1"/>
-          </p:nvPr>
-        </p:nvSpPr>
-        <p:spPr/>
-        <p:txBody>
-          <a:bodyPr>
-            <a:normAutofit fontScale="92500" lnSpcReduction="20000"/>
-          </a:bodyPr>
-          <a:lstStyle/>
-          <a:p>
-            <a:pPr>
-              <a:buNone/>
-            </a:pPr>
-            <a:r>
-              <a:rPr lang="en-US" dirty="0" smtClean="0"/>
-              <a:t>1 small machine, / yr:</a:t>
-            </a:r>
-          </a:p>
-          <a:p>
-            <a:pPr>
-              <a:buNone/>
-            </a:pPr>
-            <a:endParaRPr lang="en-US" dirty="0" smtClean="0"/>
-          </a:p>
-          <a:p>
-            <a:pPr>
-              <a:buNone/>
-            </a:pPr>
-            <a:r>
-              <a:rPr lang="en-US" dirty="0" smtClean="0"/>
-              <a:t>1.7gb of RAM, a ~1.0 GHz single-core CPU, 160gb of local disk.</a:t>
-            </a:r>
-          </a:p>
-          <a:p>
-            <a:pPr>
-              <a:buNone/>
-            </a:pPr>
-            <a:endParaRPr lang="en-US" dirty="0" smtClean="0"/>
-          </a:p>
-          <a:p>
-            <a:pPr>
-              <a:buNone/>
-            </a:pPr>
-            <a:r>
-              <a:rPr lang="en-US" dirty="0" smtClean="0"/>
-              <a:t>$.06 / hr</a:t>
-            </a:r>
-          </a:p>
-          <a:p>
-            <a:pPr>
-              <a:buNone/>
-            </a:pPr>
-            <a:r>
-              <a:rPr lang="en-US" dirty="0" smtClean="0"/>
-              <a:t>8760 hrs / year</a:t>
-            </a:r>
-          </a:p>
-          <a:p>
-            <a:pPr>
-              <a:buNone/>
-            </a:pPr>
-            <a:r>
-              <a:rPr lang="en-US" dirty="0" smtClean="0"/>
-              <a:t>=&gt; ~$525/ year.</a:t>
-            </a:r>
-          </a:p>
-          <a:p>
-            <a:pPr>
-              <a:buNone/>
-            </a:pPr>
-            <a:endParaRPr lang="en-US" dirty="0" smtClean="0"/>
-          </a:p>
-          <a:p>
-            <a:pPr algn="ctr">
-              <a:buNone/>
-            </a:pPr>
-            <a:r>
-              <a:rPr lang="en-US" i="1" dirty="0" smtClean="0"/>
-              <a:t>~a somewhat effective server replacement.</a:t>
-            </a:r>
-            <a:endParaRPr lang="en-US" dirty="0" smtClean="0"/>
-          </a:p>
-          <a:p>
-            <a:pPr>
-              <a:buNone/>
-            </a:pPr>
-            <a:endParaRPr lang="en-US" dirty="0"/>
-          </a:p>
-        </p:txBody>
-      </p:sp>
+              <a:rPr lang="en-US" sz="3600" dirty="0" smtClean="0"/>
+              <a:t>Did you know they rent computers!?</a:t>
+            </a:r>
+          </a:p>
+          <a:p>
+            <a:endParaRPr lang="en-US" sz="3600" dirty="0" smtClean="0"/>
+          </a:p>
+          <a:p>
+            <a:r>
+              <a:rPr lang="en-US" sz="3600" dirty="0" smtClean="0"/>
+              <a:t>Rumors are that it’s more lucrative than their book selling division…</a:t>
+            </a:r>
+            <a:endParaRPr lang="en-US" sz="3600" dirty="0"/>
+          </a:p>
+        </p:txBody>
+      </p:sp>
+      <p:pic>
+        <p:nvPicPr>
+          <p:cNvPr id="4" name="Picture 3"/>
+          <p:cNvPicPr>
+            <a:picLocks noChangeAspect="1"/>
+          </p:cNvPicPr>
+          <p:nvPr/>
+        </p:nvPicPr>
+        <p:blipFill>
+          <a:blip r:embed="rId2"/>
+          <a:stretch>
+            <a:fillRect/>
+          </a:stretch>
+        </p:blipFill>
+        <p:spPr>
+          <a:xfrm>
+            <a:off x="151077" y="4566753"/>
+            <a:ext cx="4724400" cy="1714500"/>
+          </a:xfrm>
+          <a:prstGeom prst="rect">
+            <a:avLst/>
+          </a:prstGeom>
+        </p:spPr>
+      </p:pic>
     </p:spTree>
     <p:extLst>
       <p:ext uri="{BB962C8B-B14F-4D97-AF65-F5344CB8AC3E}">
-        <p14:creationId xmlns:p14="http://schemas.microsoft.com/office/powerpoint/2010/main" val="492310162"/>
+        <p14:creationId xmlns:p14="http://schemas.microsoft.com/office/powerpoint/2010/main" val="752438481"/>
       </p:ext>
     </p:extLst>
   </p:cSld>
@@ -4682,11 +5138,13 @@
         </p:nvSpPr>
         <p:spPr/>
         <p:txBody>
-          <a:bodyPr>
-            <a:normAutofit/>
-          </a:bodyPr>
-          <a:lstStyle/>
-          <a:p>
+          <a:bodyPr/>
+          <a:lstStyle/>
+          <a:p>
+            <a:r>
+              <a:rPr lang="en-US" dirty="0" smtClean="0"/>
+              <a:t>Terms</a:t>
+            </a:r>
             <a:endParaRPr lang="en-US" dirty="0"/>
           </a:p>
         </p:txBody>
@@ -4703,75 +5161,34 @@
         </p:nvSpPr>
         <p:spPr/>
         <p:txBody>
-          <a:bodyPr>
-            <a:normAutofit fontScale="92500"/>
-          </a:bodyPr>
+          <a:bodyPr/>
           <a:lstStyle/>
           <a:p>
             <a:pPr>
               <a:buNone/>
             </a:pPr>
             <a:r>
-              <a:rPr lang="en-US" dirty="0" smtClean="0"/>
-              <a:t>1 high-memory quadruple extra-large instance / yr:</a:t>
+              <a:rPr lang="en-US" sz="3600" dirty="0" smtClean="0"/>
+              <a:t>EC2 – Elastic Cloud Computing, computer rental from Amazon.</a:t>
             </a:r>
           </a:p>
           <a:p>
             <a:pPr>
               <a:buNone/>
             </a:pPr>
-            <a:endParaRPr lang="en-US" dirty="0" smtClean="0"/>
+            <a:endParaRPr lang="en-US" sz="3600" dirty="0" smtClean="0"/>
           </a:p>
           <a:p>
             <a:pPr>
               <a:buNone/>
             </a:pPr>
             <a:r>
-              <a:rPr lang="en-US" dirty="0" smtClean="0"/>
-              <a:t>68.4 gb of RAM, 8 core @ ~3.2 GHz, 1.7tb of local disk.</a:t>
+              <a:rPr lang="en-US" sz="3600" dirty="0" smtClean="0"/>
+              <a:t>EBS – Elastic Block Storage, virtual hard drive rental from Amazon.</a:t>
             </a:r>
           </a:p>
           <a:p>
             <a:pPr>
-              <a:buNone/>
-            </a:pPr>
-            <a:endParaRPr lang="en-US" dirty="0" smtClean="0"/>
-          </a:p>
-          <a:p>
-            <a:pPr>
-              <a:buNone/>
-            </a:pPr>
-            <a:r>
-              <a:rPr lang="en-US" dirty="0" smtClean="0"/>
-              <a:t>$1.64 / hr</a:t>
-            </a:r>
-          </a:p>
-          <a:p>
-            <a:pPr>
-              <a:buNone/>
-            </a:pPr>
-            <a:r>
-              <a:rPr lang="en-US" dirty="0" smtClean="0"/>
-              <a:t>8760 hrs / year</a:t>
-            </a:r>
-          </a:p>
-          <a:p>
-            <a:pPr>
-              <a:buNone/>
-            </a:pPr>
-            <a:r>
-              <a:rPr lang="en-US" dirty="0" smtClean="0"/>
-              <a:t>=&gt; $14,400 / year</a:t>
-            </a:r>
-          </a:p>
-          <a:p>
-            <a:pPr>
-              <a:buNone/>
-            </a:pPr>
-            <a:endParaRPr lang="en-US" dirty="0" smtClean="0"/>
-          </a:p>
-          <a:p>
-            <a:pPr algn="ctr">
               <a:buNone/>
             </a:pPr>
             <a:endParaRPr lang="en-US" dirty="0" smtClean="0"/>
@@ -4787,7 +5204,7 @@
     </p:spTree>
     <p:extLst>
       <p:ext uri="{BB962C8B-B14F-4D97-AF65-F5344CB8AC3E}">
-        <p14:creationId xmlns:p14="http://schemas.microsoft.com/office/powerpoint/2010/main" val="665008048"/>
+        <p14:creationId xmlns:p14="http://schemas.microsoft.com/office/powerpoint/2010/main" val="3925019170"/>
       </p:ext>
     </p:extLst>
   </p:cSld>
@@ -4838,6 +5255,10 @@
           </a:bodyPr>
           <a:lstStyle/>
           <a:p>
+            <a:r>
+              <a:rPr lang="en-US" dirty="0" smtClean="0"/>
+              <a:t>Some quick calculations:</a:t>
+            </a:r>
             <a:endParaRPr lang="en-US" dirty="0"/>
           </a:p>
         </p:txBody>
@@ -4855,7 +5276,7 @@
         <p:spPr/>
         <p:txBody>
           <a:bodyPr>
-            <a:normAutofit fontScale="92500"/>
+            <a:normAutofit fontScale="92500" lnSpcReduction="20000"/>
           </a:bodyPr>
           <a:lstStyle/>
           <a:p>
@@ -4863,8 +5284,12 @@
               <a:buNone/>
             </a:pPr>
             <a:r>
-              <a:rPr lang="en-US" dirty="0" smtClean="0"/>
-              <a:t>20 high-CPU extra large machines, for a day:</a:t>
+              <a:rPr lang="en-US" b="1" dirty="0" smtClean="0"/>
+              <a:t>1 small machine</a:t>
+            </a:r>
+            <a:r>
+              <a:rPr lang="en-US" dirty="0" smtClean="0"/>
+              <a:t>, / yr:</a:t>
             </a:r>
           </a:p>
           <a:p>
@@ -4879,15 +5304,7 @@
             </a:pPr>
             <a:r>
               <a:rPr lang="en-US" dirty="0" smtClean="0"/>
-              <a:t>7gb of RAM, 8 </a:t>
-            </a:r>
-            <a:r>
-              <a:rPr lang="en-US" dirty="0" err="1" smtClean="0"/>
-              <a:t>x</a:t>
-            </a:r>
-            <a:r>
-              <a:rPr lang="en-US" dirty="0" smtClean="0"/>
-              <a:t> 2.5 GHz CPUs, 1.7tb of local disk.</a:t>
+              <a:t>1.7gb of RAM, a ~1.0 GHz single-core CPU, 160gb of local disk.</a:t>
             </a:r>
           </a:p>
           <a:p>
@@ -4902,7 +5319,7 @@
             </a:pPr>
             <a:r>
               <a:rPr lang="en-US" dirty="0" smtClean="0"/>
-              <a:t>$0.58 / hr</a:t>
+              <a:t>$.06 / hr</a:t>
             </a:r>
           </a:p>
           <a:p>
@@ -4911,7 +5328,7 @@
             </a:pPr>
             <a:r>
               <a:rPr lang="en-US" dirty="0" smtClean="0"/>
-              <a:t>24 hrs / day</a:t>
+              <a:t>8760 hrs / year</a:t>
             </a:r>
           </a:p>
           <a:p>
@@ -4920,36 +5337,65 @@
             </a:pPr>
             <a:r>
               <a:rPr lang="en-US" dirty="0" smtClean="0"/>
-              <a:t>20 machines</a:t>
+              <a:t>                          =</a:t>
+            </a:r>
+            <a:r>
+              <a:rPr lang="en-US" dirty="0" smtClean="0"/>
+              <a:t>&gt; ~$525/ year.</a:t>
             </a:r>
           </a:p>
           <a:p>
             <a:pPr>
               <a:buNone/>
             </a:pPr>
-            <a:r>
-              <a:rPr lang="en-US" dirty="0" smtClean="0"/>
-              <a:t>=&gt; ~$278/ day.</a:t>
-            </a:r>
+            <a:endParaRPr lang="en-US" dirty="0" smtClean="0"/>
+          </a:p>
+          <a:p>
+            <a:pPr algn="ctr">
+              <a:buNone/>
+            </a:pPr>
+            <a:r>
+              <a:rPr lang="en-US" i="1" dirty="0" smtClean="0"/>
+              <a:t>~a somewhat effective server replacement.</a:t>
+            </a:r>
+            <a:endParaRPr lang="en-US" dirty="0" smtClean="0"/>
           </a:p>
           <a:p>
             <a:pPr>
               <a:buNone/>
             </a:pPr>
-            <a:endParaRPr lang="en-US" dirty="0" smtClean="0"/>
-          </a:p>
-          <a:p>
-            <a:pPr>
-              <a:buNone/>
-            </a:pPr>
             <a:endParaRPr lang="en-US" dirty="0"/>
           </a:p>
         </p:txBody>
       </p:sp>
+      <p:pic>
+        <p:nvPicPr>
+          <p:cNvPr id="4" name="Picture 3"/>
+          <p:cNvPicPr>
+            <a:picLocks noChangeAspect="1"/>
+          </p:cNvPicPr>
+          <p:nvPr/>
+        </p:nvPicPr>
+        <p:blipFill>
+          <a:blip r:embed="rId2"/>
+          <a:stretch>
+            <a:fillRect/>
+          </a:stretch>
+        </p:blipFill>
+        <p:spPr>
+          <a:xfrm>
+            <a:off x="7407554" y="3569900"/>
+            <a:ext cx="1431646" cy="1431646"/>
+          </a:xfrm>
+          <a:prstGeom prst="rect">
+            <a:avLst/>
+          </a:prstGeom>
+        </p:spPr>
+      </p:pic>
     </p:spTree>
     <p:extLst>
       <p:ext uri="{BB962C8B-B14F-4D97-AF65-F5344CB8AC3E}">
-        <p14:creationId xmlns:p14="http://schemas.microsoft.com/office/powerpoint/2010/main" val="3791175417"/>
+        <p14:creationId xmlns:p14="http://schemas.microsoft.com/office/powerpoint/2010/main" val="492310162"/>
       </p:ext>
     </p:extLst>
   </p:cSld>

</xml_diff>